<commit_message>
Class diagram reviewed, final version Presentation - just 1 fix of number of classes
</commit_message>
<xml_diff>
--- a/UML Modeling Task Team 01 Presentation.pptx
+++ b/UML Modeling Task Team 01 Presentation.pptx
@@ -1079,8 +1079,8 @@
   </dgm:ptLst>
   <dgm:cxnLst>
     <dgm:cxn modelId="{B5CDA5E9-5EB9-4697-BE7A-24260AA77BFD}" type="presOf" srcId="{55DA09FF-1740-49FC-BB02-FEE48705316C}" destId="{EE8FDAD4-B07A-4079-A343-652A9E40DB65}" srcOrd="0" destOrd="0" presId="urn:microsoft.com/office/officeart/2005/8/layout/rings+Icon"/>
+    <dgm:cxn modelId="{F25D014F-1616-4A88-AD2C-6CBA9BC2F22C}" type="presOf" srcId="{820D6FF9-0EF7-490F-8D45-1C58BB8D9EA9}" destId="{68953299-A518-44AB-AE9B-57FBC10AD006}" srcOrd="0" destOrd="0" presId="urn:microsoft.com/office/officeart/2005/8/layout/rings+Icon"/>
     <dgm:cxn modelId="{A249AA92-C625-4AD5-BEC1-91F4989B5B8C}" type="presOf" srcId="{B914228B-0BD1-4BF9-BB15-ED12428270F0}" destId="{675280E5-EC48-4280-A0BA-4371836A13C4}" srcOrd="0" destOrd="0" presId="urn:microsoft.com/office/officeart/2005/8/layout/rings+Icon"/>
-    <dgm:cxn modelId="{F25D014F-1616-4A88-AD2C-6CBA9BC2F22C}" type="presOf" srcId="{820D6FF9-0EF7-490F-8D45-1C58BB8D9EA9}" destId="{68953299-A518-44AB-AE9B-57FBC10AD006}" srcOrd="0" destOrd="0" presId="urn:microsoft.com/office/officeart/2005/8/layout/rings+Icon"/>
     <dgm:cxn modelId="{88521740-29AA-4A85-987E-5A6D4571258F}" srcId="{55DA09FF-1740-49FC-BB02-FEE48705316C}" destId="{820D6FF9-0EF7-490F-8D45-1C58BB8D9EA9}" srcOrd="1" destOrd="0" parTransId="{8EBE668A-0D3E-4B9B-8721-F8BA6673A0B3}" sibTransId="{E70264BF-6BF2-4C5F-B511-DFBBA61D1707}"/>
     <dgm:cxn modelId="{3CE932BB-8DA3-4A60-A59C-82403557E5E6}" type="presOf" srcId="{69C0681E-4F85-4D3D-B266-DEE60B4AB56F}" destId="{EDA419BB-20CB-4565-BBF9-694E54020AAD}" srcOrd="0" destOrd="0" presId="urn:microsoft.com/office/officeart/2005/8/layout/rings+Icon"/>
     <dgm:cxn modelId="{E6CED2D2-91C3-446C-A99B-B4B64E7A34C5}" srcId="{55DA09FF-1740-49FC-BB02-FEE48705316C}" destId="{B914228B-0BD1-4BF9-BB15-ED12428270F0}" srcOrd="0" destOrd="0" parTransId="{98AE1F9A-FA16-41E2-8B6C-96004532B631}" sibTransId="{9F938A2C-1317-4DA8-8D7A-B781C757E35F}"/>
@@ -3095,7 +3095,7 @@
             <a:fld id="{A73EA835-BE27-444B-A427-72A16C7753E8}" type="datetimeFigureOut">
               <a:rPr lang="de-DE" smtClean="0"/>
               <a:pPr/>
-              <a:t>15.06.2014</a:t>
+              <a:t>17.06.2014</a:t>
             </a:fld>
             <a:endParaRPr lang="de-DE"/>
           </a:p>
@@ -3263,7 +3263,7 @@
             <a:fld id="{3917A5D4-468F-5647-9CB0-CC9B026B626F}" type="datetimeFigureOut">
               <a:rPr lang="de-DE" smtClean="0"/>
               <a:pPr/>
-              <a:t>15.06.2014</a:t>
+              <a:t>17.06.2014</a:t>
             </a:fld>
             <a:endParaRPr lang="de-DE"/>
           </a:p>
@@ -3715,7 +3715,7 @@
             <a:fld id="{D3B3044F-6B87-CA45-B225-E871CBADBFBC}" type="datetime1">
               <a:rPr lang="en-US" smtClean="0"/>
               <a:pPr/>
-              <a:t>6/15/2014</a:t>
+              <a:t>6/17/2014</a:t>
             </a:fld>
             <a:endParaRPr lang="de-DE" dirty="0"/>
           </a:p>
@@ -3909,7 +3909,7 @@
             <a:fld id="{FC8CF5DD-CE8D-4D4E-9B3E-B5C1C9498CE9}" type="datetime1">
               <a:rPr lang="en-US" smtClean="0"/>
               <a:pPr/>
-              <a:t>6/15/2014</a:t>
+              <a:t>6/17/2014</a:t>
             </a:fld>
             <a:endParaRPr lang="de-DE" dirty="0"/>
           </a:p>
@@ -4149,7 +4149,7 @@
             <a:fld id="{2520C4A5-3106-EB44-B005-51963A0C28FE}" type="datetime1">
               <a:rPr lang="en-US" smtClean="0"/>
               <a:pPr/>
-              <a:t>6/15/2014</a:t>
+              <a:t>6/17/2014</a:t>
             </a:fld>
             <a:endParaRPr lang="de-DE" dirty="0"/>
           </a:p>
@@ -4379,7 +4379,7 @@
             <a:fld id="{CFAB2C8E-F352-834C-8D6D-5B3BAA14EC33}" type="datetime1">
               <a:rPr lang="en-US" smtClean="0"/>
               <a:pPr/>
-              <a:t>6/15/2014</a:t>
+              <a:t>6/17/2014</a:t>
             </a:fld>
             <a:endParaRPr lang="de-DE" dirty="0"/>
           </a:p>
@@ -4689,7 +4689,7 @@
             <a:fld id="{2E2DF7CA-40A9-F542-8E4F-DFDB01C7D549}" type="datetime1">
               <a:rPr lang="en-US" smtClean="0"/>
               <a:pPr/>
-              <a:t>6/15/2014</a:t>
+              <a:t>6/17/2014</a:t>
             </a:fld>
             <a:endParaRPr lang="de-DE" dirty="0"/>
           </a:p>
@@ -5037,7 +5037,7 @@
             <a:fld id="{AD29E2A9-67C2-074E-AC75-64ADE07C878E}" type="datetime1">
               <a:rPr lang="en-US" smtClean="0"/>
               <a:pPr/>
-              <a:t>6/15/2014</a:t>
+              <a:t>6/17/2014</a:t>
             </a:fld>
             <a:endParaRPr lang="de-DE" dirty="0"/>
           </a:p>
@@ -5519,7 +5519,7 @@
             <a:fld id="{3F48D7E1-43A1-1C48-A64E-DC0C64416B6A}" type="datetime1">
               <a:rPr lang="en-US" smtClean="0"/>
               <a:pPr/>
-              <a:t>6/15/2014</a:t>
+              <a:t>6/17/2014</a:t>
             </a:fld>
             <a:endParaRPr lang="de-DE" dirty="0"/>
           </a:p>
@@ -5697,7 +5697,7 @@
             <a:fld id="{CCB2A47A-2351-8543-8EEB-A0EB0FF5B4DC}" type="datetime1">
               <a:rPr lang="en-US" smtClean="0"/>
               <a:pPr/>
-              <a:t>6/15/2014</a:t>
+              <a:t>6/17/2014</a:t>
             </a:fld>
             <a:endParaRPr lang="de-DE" dirty="0"/>
           </a:p>
@@ -5852,7 +5852,7 @@
             <a:fld id="{E0F2D0E2-C17E-4547-81C8-CB780F680F3E}" type="datetime1">
               <a:rPr lang="en-US" smtClean="0"/>
               <a:pPr/>
-              <a:t>6/15/2014</a:t>
+              <a:t>6/17/2014</a:t>
             </a:fld>
             <a:endParaRPr lang="de-DE" dirty="0"/>
           </a:p>
@@ -6189,7 +6189,7 @@
             <a:fld id="{01D3412C-21E1-CA4C-81F0-C465D69310E0}" type="datetime1">
               <a:rPr lang="en-US" smtClean="0"/>
               <a:pPr/>
-              <a:t>6/15/2014</a:t>
+              <a:t>6/17/2014</a:t>
             </a:fld>
             <a:endParaRPr lang="de-DE" dirty="0"/>
           </a:p>
@@ -6502,7 +6502,7 @@
             <a:fld id="{184F5975-4D8E-7842-95A0-4F2EEEAFBC5B}" type="datetime1">
               <a:rPr lang="en-US" smtClean="0"/>
               <a:pPr/>
-              <a:t>6/15/2014</a:t>
+              <a:t>6/17/2014</a:t>
             </a:fld>
             <a:endParaRPr lang="de-DE" dirty="0"/>
           </a:p>
@@ -6757,7 +6757,7 @@
             <a:fld id="{5335145A-B906-6F4F-8952-00D5BC40E313}" type="datetime1">
               <a:rPr lang="en-US" smtClean="0"/>
               <a:pPr/>
-              <a:t>6/15/2014</a:t>
+              <a:t>6/17/2014</a:t>
             </a:fld>
             <a:endParaRPr lang="de-DE" dirty="0"/>
           </a:p>
@@ -7742,8 +7742,21 @@
                 <a:ea typeface="Verdana" panose="020B0604030504040204" pitchFamily="34" charset="0"/>
                 <a:cs typeface="Verdana" panose="020B0604030504040204" pitchFamily="34" charset="0"/>
               </a:rPr>
-              <a:t>Identifying the core entities and reducing their number up to 16-17?</a:t>
-            </a:r>
+              <a:t>Identifying the core entities and reducing their number up </a:t>
+            </a:r>
+            <a:r>
+              <a:rPr lang="en-US" sz="2600" dirty="0" smtClean="0">
+                <a:latin typeface="Verdana" panose="020B0604030504040204" pitchFamily="34" charset="0"/>
+                <a:ea typeface="Verdana" panose="020B0604030504040204" pitchFamily="34" charset="0"/>
+                <a:cs typeface="Verdana" panose="020B0604030504040204" pitchFamily="34" charset="0"/>
+              </a:rPr>
+              <a:t>to 17</a:t>
+            </a:r>
+            <a:endParaRPr lang="en-US" sz="2600" dirty="0" smtClean="0">
+              <a:latin typeface="Verdana" panose="020B0604030504040204" pitchFamily="34" charset="0"/>
+              <a:ea typeface="Verdana" panose="020B0604030504040204" pitchFamily="34" charset="0"/>
+              <a:cs typeface="Verdana" panose="020B0604030504040204" pitchFamily="34" charset="0"/>
+            </a:endParaRPr>
           </a:p>
           <a:p>
             <a:pPr lvl="1"/>

</xml_diff>